<commit_message>
Updated intro and short read intro presentations
</commit_message>
<xml_diff>
--- a/Presentations_2022/LSHTM2022_Talk_Introduction.pptx
+++ b/Presentations_2022/LSHTM2022_Talk_Introduction.pptx
@@ -5,7 +5,7 @@
     <p:sldMasterId id="2147483648" r:id="rId1"/>
   </p:sldMasterIdLst>
   <p:notesMasterIdLst>
-    <p:notesMasterId r:id="rId23"/>
+    <p:notesMasterId r:id="rId20"/>
   </p:notesMasterIdLst>
   <p:sldIdLst>
     <p:sldId id="256" r:id="rId2"/>
@@ -25,10 +25,7 @@
     <p:sldId id="283" r:id="rId16"/>
     <p:sldId id="312" r:id="rId17"/>
     <p:sldId id="311" r:id="rId18"/>
-    <p:sldId id="309" r:id="rId19"/>
-    <p:sldId id="275" r:id="rId20"/>
-    <p:sldId id="277" r:id="rId21"/>
-    <p:sldId id="327" r:id="rId22"/>
+    <p:sldId id="327" r:id="rId19"/>
   </p:sldIdLst>
   <p:sldSz cx="12192000" cy="6858000"/>
   <p:notesSz cx="6858000" cy="9144000"/>
@@ -564,330 +561,6 @@
     <p:extLst>
       <p:ext uri="{BB962C8B-B14F-4D97-AF65-F5344CB8AC3E}">
         <p14:creationId xmlns:p14="http://schemas.microsoft.com/office/powerpoint/2010/main" val="3619422578"/>
-      </p:ext>
-    </p:extLst>
-  </p:cSld>
-  <p:clrMapOvr>
-    <a:masterClrMapping/>
-  </p:clrMapOvr>
-</p:notes>
-</file>
-
-<file path=ppt/notesSlides/notesSlide2.xml><?xml version="1.0" encoding="utf-8"?>
-<p:notes xmlns:a="http://schemas.openxmlformats.org/drawingml/2006/main" xmlns:r="http://schemas.openxmlformats.org/officeDocument/2006/relationships" xmlns:p="http://schemas.openxmlformats.org/presentationml/2006/main">
-  <p:cSld>
-    <p:spTree>
-      <p:nvGrpSpPr>
-        <p:cNvPr id="1" name=""/>
-        <p:cNvGrpSpPr/>
-        <p:nvPr/>
-      </p:nvGrpSpPr>
-      <p:grpSpPr>
-        <a:xfrm>
-          <a:off x="0" y="0"/>
-          <a:ext cx="0" cy="0"/>
-          <a:chOff x="0" y="0"/>
-          <a:chExt cx="0" cy="0"/>
-        </a:xfrm>
-      </p:grpSpPr>
-      <p:sp>
-        <p:nvSpPr>
-          <p:cNvPr id="7" name="Rectangle 7"/>
-          <p:cNvSpPr>
-            <a:spLocks noGrp="1" noChangeArrowheads="1"/>
-          </p:cNvSpPr>
-          <p:nvPr>
-            <p:ph type="sldNum" sz="quarter" idx="5"/>
-          </p:nvPr>
-        </p:nvSpPr>
-        <p:spPr>
-          <a:ln/>
-        </p:spPr>
-        <p:txBody>
-          <a:bodyPr/>
-          <a:lstStyle/>
-          <a:p>
-            <a:fld id="{2B3B4C34-D922-5D47-ACD3-D8B8F6EA75EA}" type="slidenum">
-              <a:rPr lang="en-US"/>
-              <a:pPr/>
-              <a:t>19</a:t>
-            </a:fld>
-            <a:endParaRPr lang="en-US"/>
-          </a:p>
-        </p:txBody>
-      </p:sp>
-      <p:sp>
-        <p:nvSpPr>
-          <p:cNvPr id="256002" name="Rectangle 2"/>
-          <p:cNvSpPr>
-            <a:spLocks noGrp="1" noRot="1" noChangeAspect="1" noChangeArrowheads="1"/>
-          </p:cNvSpPr>
-          <p:nvPr>
-            <p:ph type="sldImg"/>
-          </p:nvPr>
-        </p:nvSpPr>
-        <p:spPr bwMode="auto">
-          <a:xfrm>
-            <a:off x="381000" y="685800"/>
-            <a:ext cx="6096000" cy="3429000"/>
-          </a:xfrm>
-          <a:prstGeom prst="rect">
-            <a:avLst/>
-          </a:prstGeom>
-          <a:solidFill>
-            <a:srgbClr val="FFFFFF"/>
-          </a:solidFill>
-          <a:ln>
-            <a:solidFill>
-              <a:srgbClr val="000000"/>
-            </a:solidFill>
-            <a:miter lim="800000"/>
-            <a:headEnd/>
-            <a:tailEnd/>
-          </a:ln>
-        </p:spPr>
-      </p:sp>
-      <p:sp>
-        <p:nvSpPr>
-          <p:cNvPr id="256003" name="Rectangle 3"/>
-          <p:cNvSpPr>
-            <a:spLocks noGrp="1" noChangeArrowheads="1"/>
-          </p:cNvSpPr>
-          <p:nvPr>
-            <p:ph type="body" idx="1"/>
-          </p:nvPr>
-        </p:nvSpPr>
-        <p:spPr bwMode="auto">
-          <a:xfrm>
-            <a:off x="914400" y="4343400"/>
-            <a:ext cx="5029200" cy="4114800"/>
-          </a:xfrm>
-          <a:prstGeom prst="rect">
-            <a:avLst/>
-          </a:prstGeom>
-          <a:solidFill>
-            <a:srgbClr val="FFFFFF"/>
-          </a:solidFill>
-          <a:ln>
-            <a:solidFill>
-              <a:srgbClr val="000000"/>
-            </a:solidFill>
-            <a:miter lim="800000"/>
-            <a:headEnd/>
-            <a:tailEnd/>
-          </a:ln>
-        </p:spPr>
-        <p:txBody>
-          <a:bodyPr>
-            <a:prstTxWarp prst="textNoShape">
-              <a:avLst/>
-            </a:prstTxWarp>
-            <a:normAutofit fontScale="92500" lnSpcReduction="10000"/>
-          </a:bodyPr>
-          <a:lstStyle/>
-          <a:p>
-            <a:r>
-              <a:rPr lang="en-US"/>
-              <a:t> *  Editorial</a:t>
-            </a:r>
-          </a:p>
-          <a:p>
-            <a:endParaRPr lang="en-US"/>
-          </a:p>
-          <a:p>
-            <a:r>
-              <a:rPr lang="en-US"/>
-              <a:t>A new genetic variant of Chlamydia trachomatis</a:t>
-            </a:r>
-          </a:p>
-          <a:p>
-            <a:endParaRPr lang="en-US"/>
-          </a:p>
-          <a:p>
-            <a:r>
-              <a:rPr lang="en-US"/>
-              <a:t>   1. Björn Herrmann</a:t>
-            </a:r>
-          </a:p>
-          <a:p>
-            <a:endParaRPr lang="en-US"/>
-          </a:p>
-          <a:p>
-            <a:r>
-              <a:rPr lang="en-US"/>
-              <a:t>   1. Correspondence to: - Björn Herrmann - Department of Clinical Microbiology, Uppsala University Hospital, S-751 85 Uppsala, Sweden; bjorn.herrmann@medsci.uu.se</a:t>
-            </a:r>
-          </a:p>
-          <a:p>
-            <a:endParaRPr lang="en-US"/>
-          </a:p>
-          <a:p>
-            <a:r>
-              <a:rPr lang="en-US"/>
-              <a:t>    * Chlamydia trachomatis</a:t>
-            </a:r>
-          </a:p>
-          <a:p>
-            <a:r>
-              <a:rPr lang="en-US"/>
-              <a:t>    * Sweden</a:t>
-            </a:r>
-          </a:p>
-          <a:p>
-            <a:endParaRPr lang="en-US"/>
-          </a:p>
-          <a:p>
-            <a:r>
-              <a:rPr lang="en-US"/>
-              <a:t>A thrilling story in Sweden, with global impact</a:t>
-            </a:r>
-          </a:p>
-          <a:p>
-            <a:endParaRPr lang="en-US"/>
-          </a:p>
-          <a:p>
-            <a:r>
-              <a:rPr lang="en-US"/>
-              <a:t>A new variant of Chlamydia trachomatis was discovered in Sweden in 2006. This variant contains a mutant sequence that cannot be detected with either the Abbott m2000 (Abbott Diagnostics, Chicago, IL, USA) or Cobas Amplicor/TaqMan48 (Roche Diagnostics, Basel, Switzerland) systems. 1 The first description reported that the new variant constituted 13% of all detected chlamydia infections (from mid-September to October 2006) in the county of Halland (south west of Sweden). It soon became apparent that the proportion was higher and that the new variant had spread widely in Sweden. We now know that in the counties that have used the Abbott or Roche test systems during the past year or so the new variant accounts for 20% to 65% of all detected chlamydia cases. In local areas, as many as 78% of all cases have been found to have the mutation (Britta Loré, personal communication). </a:t>
-            </a:r>
-          </a:p>
-        </p:txBody>
-      </p:sp>
-    </p:spTree>
-    <p:extLst>
-      <p:ext uri="{BB962C8B-B14F-4D97-AF65-F5344CB8AC3E}">
-        <p14:creationId xmlns:p14="http://schemas.microsoft.com/office/powerpoint/2010/main" val="3823818832"/>
-      </p:ext>
-    </p:extLst>
-  </p:cSld>
-  <p:clrMapOvr>
-    <a:masterClrMapping/>
-  </p:clrMapOvr>
-</p:notes>
-</file>
-
-<file path=ppt/notesSlides/notesSlide3.xml><?xml version="1.0" encoding="utf-8"?>
-<p:notes xmlns:a="http://schemas.openxmlformats.org/drawingml/2006/main" xmlns:r="http://schemas.openxmlformats.org/officeDocument/2006/relationships" xmlns:p="http://schemas.openxmlformats.org/presentationml/2006/main">
-  <p:cSld>
-    <p:spTree>
-      <p:nvGrpSpPr>
-        <p:cNvPr id="1" name=""/>
-        <p:cNvGrpSpPr/>
-        <p:nvPr/>
-      </p:nvGrpSpPr>
-      <p:grpSpPr>
-        <a:xfrm>
-          <a:off x="0" y="0"/>
-          <a:ext cx="0" cy="0"/>
-          <a:chOff x="0" y="0"/>
-          <a:chExt cx="0" cy="0"/>
-        </a:xfrm>
-      </p:grpSpPr>
-      <p:sp>
-        <p:nvSpPr>
-          <p:cNvPr id="7" name="Rectangle 7"/>
-          <p:cNvSpPr>
-            <a:spLocks noGrp="1" noChangeArrowheads="1"/>
-          </p:cNvSpPr>
-          <p:nvPr>
-            <p:ph type="sldNum" sz="quarter" idx="5"/>
-          </p:nvPr>
-        </p:nvSpPr>
-        <p:spPr>
-          <a:ln/>
-        </p:spPr>
-        <p:txBody>
-          <a:bodyPr/>
-          <a:lstStyle/>
-          <a:p>
-            <a:fld id="{BAEE2512-FAAA-1640-81E7-E143C1EAFE7E}" type="slidenum">
-              <a:rPr lang="en-US"/>
-              <a:pPr/>
-              <a:t>20</a:t>
-            </a:fld>
-            <a:endParaRPr lang="en-US"/>
-          </a:p>
-        </p:txBody>
-      </p:sp>
-      <p:sp>
-        <p:nvSpPr>
-          <p:cNvPr id="260098" name="Rectangle 2"/>
-          <p:cNvSpPr>
-            <a:spLocks noGrp="1" noRot="1" noChangeAspect="1" noChangeArrowheads="1"/>
-          </p:cNvSpPr>
-          <p:nvPr>
-            <p:ph type="sldImg"/>
-          </p:nvPr>
-        </p:nvSpPr>
-        <p:spPr bwMode="auto">
-          <a:xfrm>
-            <a:off x="381000" y="685800"/>
-            <a:ext cx="6096000" cy="3429000"/>
-          </a:xfrm>
-          <a:prstGeom prst="rect">
-            <a:avLst/>
-          </a:prstGeom>
-          <a:solidFill>
-            <a:srgbClr val="FFFFFF"/>
-          </a:solidFill>
-          <a:ln>
-            <a:solidFill>
-              <a:srgbClr val="000000"/>
-            </a:solidFill>
-            <a:miter lim="800000"/>
-            <a:headEnd/>
-            <a:tailEnd/>
-          </a:ln>
-        </p:spPr>
-      </p:sp>
-      <p:sp>
-        <p:nvSpPr>
-          <p:cNvPr id="260099" name="Rectangle 3"/>
-          <p:cNvSpPr>
-            <a:spLocks noGrp="1" noChangeArrowheads="1"/>
-          </p:cNvSpPr>
-          <p:nvPr>
-            <p:ph type="body" idx="1"/>
-          </p:nvPr>
-        </p:nvSpPr>
-        <p:spPr bwMode="auto">
-          <a:xfrm>
-            <a:off x="914400" y="4343400"/>
-            <a:ext cx="5029200" cy="4114800"/>
-          </a:xfrm>
-          <a:prstGeom prst="rect">
-            <a:avLst/>
-          </a:prstGeom>
-          <a:solidFill>
-            <a:srgbClr val="FFFFFF"/>
-          </a:solidFill>
-          <a:ln>
-            <a:solidFill>
-              <a:srgbClr val="000000"/>
-            </a:solidFill>
-            <a:miter lim="800000"/>
-            <a:headEnd/>
-            <a:tailEnd/>
-          </a:ln>
-        </p:spPr>
-        <p:txBody>
-          <a:bodyPr>
-            <a:prstTxWarp prst="textNoShape">
-              <a:avLst/>
-            </a:prstTxWarp>
-          </a:bodyPr>
-          <a:lstStyle/>
-          <a:p>
-            <a:endParaRPr lang="en-US"/>
-          </a:p>
-        </p:txBody>
-      </p:sp>
-    </p:spTree>
-    <p:extLst>
-      <p:ext uri="{BB962C8B-B14F-4D97-AF65-F5344CB8AC3E}">
-        <p14:creationId xmlns:p14="http://schemas.microsoft.com/office/powerpoint/2010/main" val="439298787"/>
       </p:ext>
     </p:extLst>
   </p:cSld>
@@ -7268,215 +6941,106 @@
           <a:chExt cx="0" cy="0"/>
         </a:xfrm>
       </p:grpSpPr>
-      <p:pic>
-        <p:nvPicPr>
-          <p:cNvPr id="4" name="Picture 3">
+      <p:sp>
+        <p:nvSpPr>
+          <p:cNvPr id="2" name="Title 1">
             <a:extLst>
               <a:ext uri="{FF2B5EF4-FFF2-40B4-BE49-F238E27FC236}">
-                <a16:creationId xmlns:a16="http://schemas.microsoft.com/office/drawing/2014/main" id="{78108541-C64D-1546-9936-1693ECB6CF8E}"/>
+                <a16:creationId xmlns:a16="http://schemas.microsoft.com/office/drawing/2014/main" id="{F6FC10D3-D986-834E-A77A-B49A3674A540}"/>
               </a:ext>
             </a:extLst>
           </p:cNvPr>
-          <p:cNvPicPr>
-            <a:picLocks noChangeAspect="1"/>
-          </p:cNvPicPr>
-          <p:nvPr/>
-        </p:nvPicPr>
-        <p:blipFill>
-          <a:blip r:embed="rId2"/>
-          <a:stretch>
-            <a:fillRect/>
-          </a:stretch>
-        </p:blipFill>
-        <p:spPr>
-          <a:xfrm>
-            <a:off x="1619250" y="69850"/>
-            <a:ext cx="8953500" cy="6718300"/>
-          </a:xfrm>
-          <a:prstGeom prst="rect">
-            <a:avLst/>
-          </a:prstGeom>
-        </p:spPr>
-      </p:pic>
+          <p:cNvSpPr>
+            <a:spLocks noGrp="1"/>
+          </p:cNvSpPr>
+          <p:nvPr>
+            <p:ph type="title"/>
+          </p:nvPr>
+        </p:nvSpPr>
+        <p:spPr/>
+        <p:txBody>
+          <a:bodyPr/>
+          <a:lstStyle/>
+          <a:p>
+            <a:r>
+              <a:rPr lang="en-US" dirty="0"/>
+              <a:t>In this session, you will:</a:t>
+            </a:r>
+          </a:p>
+        </p:txBody>
+      </p:sp>
+      <p:sp>
+        <p:nvSpPr>
+          <p:cNvPr id="3" name="Content Placeholder 2">
+            <a:extLst>
+              <a:ext uri="{FF2B5EF4-FFF2-40B4-BE49-F238E27FC236}">
+                <a16:creationId xmlns:a16="http://schemas.microsoft.com/office/drawing/2014/main" id="{FC56F2D2-207E-6C4A-A2D2-D0BD8850D208}"/>
+              </a:ext>
+            </a:extLst>
+          </p:cNvPr>
+          <p:cNvSpPr>
+            <a:spLocks noGrp="1"/>
+          </p:cNvSpPr>
+          <p:nvPr>
+            <p:ph idx="1"/>
+          </p:nvPr>
+        </p:nvSpPr>
+        <p:spPr/>
+        <p:txBody>
+          <a:bodyPr/>
+          <a:lstStyle/>
+          <a:p>
+            <a:pPr lvl="1"/>
+            <a:r>
+              <a:rPr lang="en-US" sz="2800" dirty="0"/>
+              <a:t>Use Artemis to view genomes</a:t>
+            </a:r>
+          </a:p>
+          <a:p>
+            <a:pPr lvl="1"/>
+            <a:endParaRPr lang="en-US" sz="2800" dirty="0"/>
+          </a:p>
+          <a:p>
+            <a:pPr lvl="1"/>
+            <a:r>
+              <a:rPr lang="en-US" sz="2800" dirty="0"/>
+              <a:t>Understand genome data files</a:t>
+            </a:r>
+          </a:p>
+          <a:p>
+            <a:pPr lvl="1"/>
+            <a:endParaRPr lang="en-US" sz="2800" dirty="0"/>
+          </a:p>
+          <a:p>
+            <a:pPr lvl="1"/>
+            <a:r>
+              <a:rPr lang="en-US" sz="2800" dirty="0"/>
+              <a:t>Understand relationship between the sequence and annotation</a:t>
+            </a:r>
+          </a:p>
+          <a:p>
+            <a:pPr lvl="1"/>
+            <a:endParaRPr lang="en-US" sz="2800" dirty="0"/>
+          </a:p>
+          <a:p>
+            <a:pPr lvl="1"/>
+            <a:r>
+              <a:rPr lang="en-US" sz="2800" dirty="0"/>
+              <a:t>Understand what bacterial genomes look like and how they are arranged</a:t>
+            </a:r>
+          </a:p>
+          <a:p>
+            <a:pPr marL="0" indent="0">
+              <a:buNone/>
+            </a:pPr>
+            <a:endParaRPr lang="en-US" dirty="0"/>
+          </a:p>
+        </p:txBody>
+      </p:sp>
     </p:spTree>
     <p:extLst>
       <p:ext uri="{BB962C8B-B14F-4D97-AF65-F5344CB8AC3E}">
-        <p14:creationId xmlns:p14="http://schemas.microsoft.com/office/powerpoint/2010/main" val="3529563189"/>
-      </p:ext>
-    </p:extLst>
-  </p:cSld>
-  <p:clrMapOvr>
-    <a:masterClrMapping/>
-  </p:clrMapOvr>
-</p:sld>
-</file>
-
-<file path=ppt/slides/slide19.xml><?xml version="1.0" encoding="utf-8"?>
-<p:sld xmlns:a="http://schemas.openxmlformats.org/drawingml/2006/main" xmlns:r="http://schemas.openxmlformats.org/officeDocument/2006/relationships" xmlns:p="http://schemas.openxmlformats.org/presentationml/2006/main">
-  <p:cSld>
-    <p:spTree>
-      <p:nvGrpSpPr>
-        <p:cNvPr id="1" name=""/>
-        <p:cNvGrpSpPr/>
-        <p:nvPr/>
-      </p:nvGrpSpPr>
-      <p:grpSpPr>
-        <a:xfrm>
-          <a:off x="0" y="0"/>
-          <a:ext cx="0" cy="0"/>
-          <a:chOff x="0" y="0"/>
-          <a:chExt cx="0" cy="0"/>
-        </a:xfrm>
-      </p:grpSpPr>
-      <p:pic>
-        <p:nvPicPr>
-          <p:cNvPr id="254978" name="Picture 2" descr="Sweden"/>
-          <p:cNvPicPr>
-            <a:picLocks noChangeAspect="1" noChangeArrowheads="1"/>
-          </p:cNvPicPr>
-          <p:nvPr/>
-        </p:nvPicPr>
-        <p:blipFill>
-          <a:blip r:embed="rId3"/>
-          <a:srcRect/>
-          <a:stretch>
-            <a:fillRect/>
-          </a:stretch>
-        </p:blipFill>
-        <p:spPr bwMode="auto">
-          <a:xfrm>
-            <a:off x="2413000" y="1104900"/>
-            <a:ext cx="4140200" cy="3887788"/>
-          </a:xfrm>
-          <a:prstGeom prst="rect">
-            <a:avLst/>
-          </a:prstGeom>
-          <a:noFill/>
-          <a:ln w="9525">
-            <a:solidFill>
-              <a:schemeClr val="tx1"/>
-            </a:solidFill>
-            <a:miter lim="800000"/>
-            <a:headEnd/>
-            <a:tailEnd/>
-          </a:ln>
-        </p:spPr>
-      </p:pic>
-      <p:sp>
-        <p:nvSpPr>
-          <p:cNvPr id="254979" name="Rectangle 3"/>
-          <p:cNvSpPr>
-            <a:spLocks noChangeArrowheads="1"/>
-          </p:cNvSpPr>
-          <p:nvPr/>
-        </p:nvSpPr>
-        <p:spPr bwMode="auto">
-          <a:xfrm>
-            <a:off x="2209800" y="0"/>
-            <a:ext cx="7772400" cy="1143000"/>
-          </a:xfrm>
-          <a:prstGeom prst="rect">
-            <a:avLst/>
-          </a:prstGeom>
-          <a:noFill/>
-          <a:ln w="9525">
-            <a:noFill/>
-            <a:miter lim="800000"/>
-            <a:headEnd/>
-            <a:tailEnd/>
-          </a:ln>
-        </p:spPr>
-        <p:txBody>
-          <a:bodyPr anchor="ctr">
-            <a:prstTxWarp prst="textNoShape">
-              <a:avLst/>
-            </a:prstTxWarp>
-          </a:bodyPr>
-          <a:lstStyle/>
-          <a:p>
-            <a:pPr algn="ctr" eaLnBrk="1" hangingPunct="1"/>
-            <a:r>
-              <a:rPr lang="en-US" sz="2800">
-                <a:solidFill>
-                  <a:schemeClr val="tx2"/>
-                </a:solidFill>
-              </a:rPr>
-              <a:t>The Swedish Story</a:t>
-            </a:r>
-          </a:p>
-        </p:txBody>
-      </p:sp>
-      <p:sp>
-        <p:nvSpPr>
-          <p:cNvPr id="254980" name="Rectangle 4"/>
-          <p:cNvSpPr>
-            <a:spLocks noChangeArrowheads="1"/>
-          </p:cNvSpPr>
-          <p:nvPr/>
-        </p:nvSpPr>
-        <p:spPr bwMode="auto">
-          <a:xfrm>
-            <a:off x="6681789" y="1108075"/>
-            <a:ext cx="3743325" cy="3816350"/>
-          </a:xfrm>
-          <a:prstGeom prst="rect">
-            <a:avLst/>
-          </a:prstGeom>
-          <a:noFill/>
-          <a:ln w="9525">
-            <a:noFill/>
-            <a:miter lim="800000"/>
-            <a:headEnd/>
-            <a:tailEnd/>
-          </a:ln>
-        </p:spPr>
-        <p:txBody>
-          <a:bodyPr>
-            <a:prstTxWarp prst="textNoShape">
-              <a:avLst/>
-            </a:prstTxWarp>
-          </a:bodyPr>
-          <a:lstStyle/>
-          <a:p>
-            <a:pPr marL="342900" indent="-342900">
-              <a:spcBef>
-                <a:spcPct val="20000"/>
-              </a:spcBef>
-              <a:buFontTx/>
-              <a:buChar char="•"/>
-            </a:pPr>
-            <a:r>
-              <a:rPr lang="en-US" sz="2800" dirty="0"/>
-              <a:t>Prior to 2006, C. </a:t>
-            </a:r>
-            <a:r>
-              <a:rPr lang="en-US" sz="2800" i="1" dirty="0"/>
-              <a:t>trachomatis</a:t>
-            </a:r>
-            <a:r>
-              <a:rPr lang="en-US" sz="2800" dirty="0"/>
-              <a:t> in Sweden was following the same pattern as in the UK</a:t>
-            </a:r>
-          </a:p>
-          <a:p>
-            <a:pPr marL="342900" indent="-342900">
-              <a:spcBef>
-                <a:spcPct val="20000"/>
-              </a:spcBef>
-              <a:buFontTx/>
-              <a:buChar char="•"/>
-            </a:pPr>
-            <a:r>
-              <a:rPr lang="en-US" sz="2800" dirty="0"/>
-              <a:t>In 2006, across Sweden there was a reported drop in cases</a:t>
-            </a:r>
-          </a:p>
-        </p:txBody>
-      </p:sp>
-    </p:spTree>
-    <p:extLst>
-      <p:ext uri="{BB962C8B-B14F-4D97-AF65-F5344CB8AC3E}">
-        <p14:creationId xmlns:p14="http://schemas.microsoft.com/office/powerpoint/2010/main" val="3571471939"/>
+        <p14:creationId xmlns:p14="http://schemas.microsoft.com/office/powerpoint/2010/main" val="4142844658"/>
       </p:ext>
     </p:extLst>
   </p:cSld>
@@ -7585,350 +7149,6 @@
     <p:extLst>
       <p:ext uri="{BB962C8B-B14F-4D97-AF65-F5344CB8AC3E}">
         <p14:creationId xmlns:p14="http://schemas.microsoft.com/office/powerpoint/2010/main" val="1933924876"/>
-      </p:ext>
-    </p:extLst>
-  </p:cSld>
-  <p:clrMapOvr>
-    <a:masterClrMapping/>
-  </p:clrMapOvr>
-</p:sld>
-</file>
-
-<file path=ppt/slides/slide20.xml><?xml version="1.0" encoding="utf-8"?>
-<p:sld xmlns:a="http://schemas.openxmlformats.org/drawingml/2006/main" xmlns:r="http://schemas.openxmlformats.org/officeDocument/2006/relationships" xmlns:p="http://schemas.openxmlformats.org/presentationml/2006/main">
-  <p:cSld>
-    <p:spTree>
-      <p:nvGrpSpPr>
-        <p:cNvPr id="1" name=""/>
-        <p:cNvGrpSpPr/>
-        <p:nvPr/>
-      </p:nvGrpSpPr>
-      <p:grpSpPr>
-        <a:xfrm>
-          <a:off x="0" y="0"/>
-          <a:ext cx="0" cy="0"/>
-          <a:chOff x="0" y="0"/>
-          <a:chExt cx="0" cy="0"/>
-        </a:xfrm>
-      </p:grpSpPr>
-      <p:sp>
-        <p:nvSpPr>
-          <p:cNvPr id="259074" name="Rectangle 2"/>
-          <p:cNvSpPr>
-            <a:spLocks noGrp="1" noChangeArrowheads="1"/>
-          </p:cNvSpPr>
-          <p:nvPr>
-            <p:ph type="title"/>
-          </p:nvPr>
-        </p:nvSpPr>
-        <p:spPr>
-          <a:xfrm>
-            <a:off x="2209800" y="0"/>
-            <a:ext cx="7772400" cy="1143000"/>
-          </a:xfrm>
-        </p:spPr>
-        <p:txBody>
-          <a:bodyPr/>
-          <a:lstStyle/>
-          <a:p>
-            <a:r>
-              <a:rPr lang="en-US"/>
-              <a:t>The Swedish story</a:t>
-            </a:r>
-            <a:endParaRPr lang="en-GB"/>
-          </a:p>
-        </p:txBody>
-      </p:sp>
-      <p:sp>
-        <p:nvSpPr>
-          <p:cNvPr id="259075" name="Rectangle 3"/>
-          <p:cNvSpPr>
-            <a:spLocks noGrp="1" noChangeArrowheads="1"/>
-          </p:cNvSpPr>
-          <p:nvPr>
-            <p:ph type="body" idx="1"/>
-          </p:nvPr>
-        </p:nvSpPr>
-        <p:spPr>
-          <a:xfrm>
-            <a:off x="983673" y="1349375"/>
-            <a:ext cx="10335491" cy="4977328"/>
-          </a:xfrm>
-        </p:spPr>
-        <p:txBody>
-          <a:bodyPr>
-            <a:normAutofit/>
-          </a:bodyPr>
-          <a:lstStyle/>
-          <a:p>
-            <a:pPr>
-              <a:lnSpc>
-                <a:spcPct val="90000"/>
-              </a:lnSpc>
-            </a:pPr>
-            <a:r>
-              <a:rPr lang="en-US" dirty="0"/>
-              <a:t>It was noticed that counties using the NAATs (Abbott / Roche) diagnostic system showed a drop in </a:t>
-            </a:r>
-            <a:r>
-              <a:rPr lang="en-US" i="1" dirty="0"/>
-              <a:t>C. trachomatis</a:t>
-            </a:r>
-            <a:r>
-              <a:rPr lang="en-US" dirty="0"/>
-              <a:t> cases in 2006</a:t>
-            </a:r>
-          </a:p>
-          <a:p>
-            <a:pPr>
-              <a:lnSpc>
-                <a:spcPct val="90000"/>
-              </a:lnSpc>
-            </a:pPr>
-            <a:r>
-              <a:rPr lang="en-US" dirty="0"/>
-              <a:t>Counties using other diagnostic methods (</a:t>
-            </a:r>
-            <a:r>
-              <a:rPr lang="en-US" dirty="0" err="1"/>
-              <a:t>BecktonDickinson</a:t>
-            </a:r>
-            <a:r>
-              <a:rPr lang="en-US" dirty="0"/>
-              <a:t>) still showed an increase in cases, in line with that of previous years</a:t>
-            </a:r>
-          </a:p>
-          <a:p>
-            <a:pPr>
-              <a:lnSpc>
-                <a:spcPct val="90000"/>
-              </a:lnSpc>
-            </a:pPr>
-            <a:r>
-              <a:rPr lang="en-US" dirty="0"/>
-              <a:t>The obvious conclusion was that the NAATs was missing a subset of infections</a:t>
-            </a:r>
-          </a:p>
-          <a:p>
-            <a:pPr>
-              <a:lnSpc>
-                <a:spcPct val="90000"/>
-              </a:lnSpc>
-            </a:pPr>
-            <a:endParaRPr lang="en-US" dirty="0"/>
-          </a:p>
-          <a:p>
-            <a:pPr>
-              <a:lnSpc>
-                <a:spcPct val="90000"/>
-              </a:lnSpc>
-            </a:pPr>
-            <a:r>
-              <a:rPr lang="en-US" dirty="0"/>
-              <a:t>Why?</a:t>
-            </a:r>
-          </a:p>
-          <a:p>
-            <a:pPr lvl="1"/>
-            <a:r>
-              <a:rPr lang="en-US" dirty="0"/>
-              <a:t>Let’s find out using the awesome power of genomic sequencing!!!!</a:t>
-            </a:r>
-          </a:p>
-        </p:txBody>
-      </p:sp>
-      <p:sp>
-        <p:nvSpPr>
-          <p:cNvPr id="259076" name="Rectangle 4"/>
-          <p:cNvSpPr>
-            <a:spLocks noChangeArrowheads="1"/>
-          </p:cNvSpPr>
-          <p:nvPr/>
-        </p:nvSpPr>
-        <p:spPr bwMode="auto">
-          <a:xfrm>
-            <a:off x="12239625" y="5229225"/>
-            <a:ext cx="184731" cy="369332"/>
-          </a:xfrm>
-          <a:prstGeom prst="rect">
-            <a:avLst/>
-          </a:prstGeom>
-          <a:noFill/>
-          <a:ln w="9525">
-            <a:noFill/>
-            <a:miter lim="800000"/>
-            <a:headEnd/>
-            <a:tailEnd/>
-          </a:ln>
-        </p:spPr>
-        <p:txBody>
-          <a:bodyPr wrap="none">
-            <a:prstTxWarp prst="textNoShape">
-              <a:avLst/>
-            </a:prstTxWarp>
-            <a:spAutoFit/>
-          </a:bodyPr>
-          <a:lstStyle/>
-          <a:p>
-            <a:endParaRPr lang="en-US"/>
-          </a:p>
-        </p:txBody>
-      </p:sp>
-    </p:spTree>
-    <p:extLst>
-      <p:ext uri="{BB962C8B-B14F-4D97-AF65-F5344CB8AC3E}">
-        <p14:creationId xmlns:p14="http://schemas.microsoft.com/office/powerpoint/2010/main" val="1545410808"/>
-      </p:ext>
-    </p:extLst>
-  </p:cSld>
-  <p:clrMapOvr>
-    <a:masterClrMapping/>
-  </p:clrMapOvr>
-</p:sld>
-</file>
-
-<file path=ppt/slides/slide21.xml><?xml version="1.0" encoding="utf-8"?>
-<p:sld xmlns:a="http://schemas.openxmlformats.org/drawingml/2006/main" xmlns:r="http://schemas.openxmlformats.org/officeDocument/2006/relationships" xmlns:p="http://schemas.openxmlformats.org/presentationml/2006/main">
-  <p:cSld>
-    <p:spTree>
-      <p:nvGrpSpPr>
-        <p:cNvPr id="1" name=""/>
-        <p:cNvGrpSpPr/>
-        <p:nvPr/>
-      </p:nvGrpSpPr>
-      <p:grpSpPr>
-        <a:xfrm>
-          <a:off x="0" y="0"/>
-          <a:ext cx="0" cy="0"/>
-          <a:chOff x="0" y="0"/>
-          <a:chExt cx="0" cy="0"/>
-        </a:xfrm>
-      </p:grpSpPr>
-      <p:sp>
-        <p:nvSpPr>
-          <p:cNvPr id="2" name="Title 1">
-            <a:extLst>
-              <a:ext uri="{FF2B5EF4-FFF2-40B4-BE49-F238E27FC236}">
-                <a16:creationId xmlns:a16="http://schemas.microsoft.com/office/drawing/2014/main" id="{F6FC10D3-D986-834E-A77A-B49A3674A540}"/>
-              </a:ext>
-            </a:extLst>
-          </p:cNvPr>
-          <p:cNvSpPr>
-            <a:spLocks noGrp="1"/>
-          </p:cNvSpPr>
-          <p:nvPr>
-            <p:ph type="title"/>
-          </p:nvPr>
-        </p:nvSpPr>
-        <p:spPr/>
-        <p:txBody>
-          <a:bodyPr/>
-          <a:lstStyle/>
-          <a:p>
-            <a:r>
-              <a:rPr lang="en-US" dirty="0"/>
-              <a:t>Summary</a:t>
-            </a:r>
-          </a:p>
-        </p:txBody>
-      </p:sp>
-      <p:sp>
-        <p:nvSpPr>
-          <p:cNvPr id="3" name="Content Placeholder 2">
-            <a:extLst>
-              <a:ext uri="{FF2B5EF4-FFF2-40B4-BE49-F238E27FC236}">
-                <a16:creationId xmlns:a16="http://schemas.microsoft.com/office/drawing/2014/main" id="{FC56F2D2-207E-6C4A-A2D2-D0BD8850D208}"/>
-              </a:ext>
-            </a:extLst>
-          </p:cNvPr>
-          <p:cNvSpPr>
-            <a:spLocks noGrp="1"/>
-          </p:cNvSpPr>
-          <p:nvPr>
-            <p:ph idx="1"/>
-          </p:nvPr>
-        </p:nvSpPr>
-        <p:spPr/>
-        <p:txBody>
-          <a:bodyPr/>
-          <a:lstStyle/>
-          <a:p>
-            <a:r>
-              <a:rPr lang="en-US" dirty="0"/>
-              <a:t>Computer practical 1</a:t>
-            </a:r>
-          </a:p>
-          <a:p>
-            <a:pPr lvl="1"/>
-            <a:r>
-              <a:rPr lang="en-US" dirty="0"/>
-              <a:t>Use Artemis to view genomes</a:t>
-            </a:r>
-          </a:p>
-          <a:p>
-            <a:pPr lvl="1"/>
-            <a:r>
-              <a:rPr lang="en-US" dirty="0"/>
-              <a:t>Understand genome data files</a:t>
-            </a:r>
-          </a:p>
-          <a:p>
-            <a:pPr lvl="1"/>
-            <a:r>
-              <a:rPr lang="en-US" dirty="0"/>
-              <a:t>Understand relationship between the sequence and annotation</a:t>
-            </a:r>
-          </a:p>
-          <a:p>
-            <a:pPr lvl="1"/>
-            <a:r>
-              <a:rPr lang="en-US" dirty="0"/>
-              <a:t>Understand what bacterial genomes look like and how they are arranged</a:t>
-            </a:r>
-          </a:p>
-          <a:p>
-            <a:r>
-              <a:rPr lang="en-US" dirty="0"/>
-              <a:t>Computer practical 2</a:t>
-            </a:r>
-          </a:p>
-          <a:p>
-            <a:pPr lvl="1"/>
-            <a:r>
-              <a:rPr lang="en-US" dirty="0"/>
-              <a:t>Practice short read alignment</a:t>
-            </a:r>
-          </a:p>
-          <a:p>
-            <a:pPr lvl="1"/>
-            <a:r>
-              <a:rPr lang="en-US" dirty="0"/>
-              <a:t>View mapped reads in Artemis</a:t>
-            </a:r>
-          </a:p>
-          <a:p>
-            <a:pPr lvl="1"/>
-            <a:r>
-              <a:rPr lang="en-US" dirty="0"/>
-              <a:t>Call and view SNPs</a:t>
-            </a:r>
-          </a:p>
-          <a:p>
-            <a:pPr lvl="1"/>
-            <a:r>
-              <a:rPr lang="en-US" dirty="0"/>
-              <a:t>Uncover why the PCR test failed for new variant Chlamydia</a:t>
-            </a:r>
-          </a:p>
-          <a:p>
-            <a:endParaRPr lang="en-US" dirty="0"/>
-          </a:p>
-        </p:txBody>
-      </p:sp>
-    </p:spTree>
-    <p:extLst>
-      <p:ext uri="{BB962C8B-B14F-4D97-AF65-F5344CB8AC3E}">
-        <p14:creationId xmlns:p14="http://schemas.microsoft.com/office/powerpoint/2010/main" val="4142844658"/>
       </p:ext>
     </p:extLst>
   </p:cSld>

</xml_diff>